<commit_message>
Updated slides. Merged lectures 3&4 into 3
</commit_message>
<xml_diff>
--- a/slides/000-lecture0-course-intro.pptx
+++ b/slides/000-lecture0-course-intro.pptx
@@ -13361,7 +13361,7 @@
 </file>
 
 <file path=ppt/slides/slide3.xml><?xml version="1.0" encoding="utf-8"?>
-<p:sld xmlns:a="http://schemas.openxmlformats.org/drawingml/2006/main" xmlns:r="http://schemas.openxmlformats.org/officeDocument/2006/relationships" xmlns:p="http://schemas.openxmlformats.org/presentationml/2006/main">
+<p:sld xmlns:a="http://schemas.openxmlformats.org/drawingml/2006/main" xmlns:r="http://schemas.openxmlformats.org/officeDocument/2006/relationships" xmlns:p="http://schemas.openxmlformats.org/presentationml/2006/main" show="0">
   <p:cSld>
     <p:spTree>
       <p:nvGrpSpPr>
@@ -13662,7 +13662,7 @@
 </file>
 
 <file path=ppt/slides/slide4.xml><?xml version="1.0" encoding="utf-8"?>
-<p:sld xmlns:a="http://schemas.openxmlformats.org/drawingml/2006/main" xmlns:r="http://schemas.openxmlformats.org/officeDocument/2006/relationships" xmlns:p="http://schemas.openxmlformats.org/presentationml/2006/main">
+<p:sld xmlns:a="http://schemas.openxmlformats.org/drawingml/2006/main" xmlns:r="http://schemas.openxmlformats.org/officeDocument/2006/relationships" xmlns:p="http://schemas.openxmlformats.org/presentationml/2006/main" show="0">
   <p:cSld>
     <p:spTree>
       <p:nvGrpSpPr>
@@ -16872,7 +16872,7 @@
 </file>
 
 <file path=ppt/slides/slide8.xml><?xml version="1.0" encoding="utf-8"?>
-<p:sld xmlns:a="http://schemas.openxmlformats.org/drawingml/2006/main" xmlns:r="http://schemas.openxmlformats.org/officeDocument/2006/relationships" xmlns:p="http://schemas.openxmlformats.org/presentationml/2006/main" show="0">
+<p:sld xmlns:a="http://schemas.openxmlformats.org/drawingml/2006/main" xmlns:r="http://schemas.openxmlformats.org/officeDocument/2006/relationships" xmlns:p="http://schemas.openxmlformats.org/presentationml/2006/main">
   <p:cSld>
     <p:spTree>
       <p:nvGrpSpPr>

</xml_diff>